<commit_message>
added IR blink code
</commit_message>
<xml_diff>
--- a/Documentation/System Layout.pptx
+++ b/Documentation/System Layout.pptx
@@ -243,7 +243,7 @@
           <a:p>
             <a:fld id="{D276F627-5B48-41D3-AF7B-80B10C48AB8A}" type="datetimeFigureOut">
               <a:rPr lang="en-US" smtClean="0"/>
-              <a:t>7/11/2015</a:t>
+              <a:t>4/17/2016</a:t>
             </a:fld>
             <a:endParaRPr lang="en-US"/>
           </a:p>
@@ -413,7 +413,7 @@
           <a:p>
             <a:fld id="{D276F627-5B48-41D3-AF7B-80B10C48AB8A}" type="datetimeFigureOut">
               <a:rPr lang="en-US" smtClean="0"/>
-              <a:t>7/11/2015</a:t>
+              <a:t>4/17/2016</a:t>
             </a:fld>
             <a:endParaRPr lang="en-US"/>
           </a:p>
@@ -593,7 +593,7 @@
           <a:p>
             <a:fld id="{D276F627-5B48-41D3-AF7B-80B10C48AB8A}" type="datetimeFigureOut">
               <a:rPr lang="en-US" smtClean="0"/>
-              <a:t>7/11/2015</a:t>
+              <a:t>4/17/2016</a:t>
             </a:fld>
             <a:endParaRPr lang="en-US"/>
           </a:p>
@@ -763,7 +763,7 @@
           <a:p>
             <a:fld id="{D276F627-5B48-41D3-AF7B-80B10C48AB8A}" type="datetimeFigureOut">
               <a:rPr lang="en-US" smtClean="0"/>
-              <a:t>7/11/2015</a:t>
+              <a:t>4/17/2016</a:t>
             </a:fld>
             <a:endParaRPr lang="en-US"/>
           </a:p>
@@ -1009,7 +1009,7 @@
           <a:p>
             <a:fld id="{D276F627-5B48-41D3-AF7B-80B10C48AB8A}" type="datetimeFigureOut">
               <a:rPr lang="en-US" smtClean="0"/>
-              <a:t>7/11/2015</a:t>
+              <a:t>4/17/2016</a:t>
             </a:fld>
             <a:endParaRPr lang="en-US"/>
           </a:p>
@@ -1241,7 +1241,7 @@
           <a:p>
             <a:fld id="{D276F627-5B48-41D3-AF7B-80B10C48AB8A}" type="datetimeFigureOut">
               <a:rPr lang="en-US" smtClean="0"/>
-              <a:t>7/11/2015</a:t>
+              <a:t>4/17/2016</a:t>
             </a:fld>
             <a:endParaRPr lang="en-US"/>
           </a:p>
@@ -1608,7 +1608,7 @@
           <a:p>
             <a:fld id="{D276F627-5B48-41D3-AF7B-80B10C48AB8A}" type="datetimeFigureOut">
               <a:rPr lang="en-US" smtClean="0"/>
-              <a:t>7/11/2015</a:t>
+              <a:t>4/17/2016</a:t>
             </a:fld>
             <a:endParaRPr lang="en-US"/>
           </a:p>
@@ -1726,7 +1726,7 @@
           <a:p>
             <a:fld id="{D276F627-5B48-41D3-AF7B-80B10C48AB8A}" type="datetimeFigureOut">
               <a:rPr lang="en-US" smtClean="0"/>
-              <a:t>7/11/2015</a:t>
+              <a:t>4/17/2016</a:t>
             </a:fld>
             <a:endParaRPr lang="en-US"/>
           </a:p>
@@ -1821,7 +1821,7 @@
           <a:p>
             <a:fld id="{D276F627-5B48-41D3-AF7B-80B10C48AB8A}" type="datetimeFigureOut">
               <a:rPr lang="en-US" smtClean="0"/>
-              <a:t>7/11/2015</a:t>
+              <a:t>4/17/2016</a:t>
             </a:fld>
             <a:endParaRPr lang="en-US"/>
           </a:p>
@@ -2098,7 +2098,7 @@
           <a:p>
             <a:fld id="{D276F627-5B48-41D3-AF7B-80B10C48AB8A}" type="datetimeFigureOut">
               <a:rPr lang="en-US" smtClean="0"/>
-              <a:t>7/11/2015</a:t>
+              <a:t>4/17/2016</a:t>
             </a:fld>
             <a:endParaRPr lang="en-US"/>
           </a:p>
@@ -2351,7 +2351,7 @@
           <a:p>
             <a:fld id="{D276F627-5B48-41D3-AF7B-80B10C48AB8A}" type="datetimeFigureOut">
               <a:rPr lang="en-US" smtClean="0"/>
-              <a:t>7/11/2015</a:t>
+              <a:t>4/17/2016</a:t>
             </a:fld>
             <a:endParaRPr lang="en-US"/>
           </a:p>
@@ -2564,7 +2564,7 @@
           <a:p>
             <a:fld id="{D276F627-5B48-41D3-AF7B-80B10C48AB8A}" type="datetimeFigureOut">
               <a:rPr lang="en-US" smtClean="0"/>
-              <a:t>7/11/2015</a:t>
+              <a:t>4/17/2016</a:t>
             </a:fld>
             <a:endParaRPr lang="en-US"/>
           </a:p>
@@ -2977,7 +2977,7 @@
         </p:nvSpPr>
         <p:spPr>
           <a:xfrm>
-            <a:off x="2303849" y="2994661"/>
+            <a:off x="1768699" y="3036454"/>
             <a:ext cx="1943100" cy="1371600"/>
           </a:xfrm>
           <a:prstGeom prst="rect">
@@ -3009,21 +3009,12 @@
               <a:rPr lang="en-US" dirty="0" smtClean="0"/>
               <a:t>Control </a:t>
             </a:r>
-            <a:endParaRPr lang="en-US" dirty="0" smtClean="0"/>
           </a:p>
           <a:p>
             <a:pPr algn="ctr"/>
             <a:r>
               <a:rPr lang="en-US" dirty="0" smtClean="0"/>
-              <a:t>Software </a:t>
-            </a:r>
-            <a:r>
-              <a:rPr lang="en-US" dirty="0" smtClean="0"/>
-              <a:t>“</a:t>
-            </a:r>
-            <a:r>
-              <a:rPr lang="en-US" dirty="0" smtClean="0"/>
-              <a:t>ShrewDriver”</a:t>
+              <a:t>Software “ShrewDriver”</a:t>
             </a:r>
             <a:endParaRPr lang="en-US" dirty="0"/>
           </a:p>
@@ -3037,12 +3028,15 @@
         </p:nvSpPr>
         <p:spPr>
           <a:xfrm>
-            <a:off x="2522058" y="1352897"/>
+            <a:off x="4537876" y="1330719"/>
             <a:ext cx="1465118" cy="685800"/>
           </a:xfrm>
           <a:prstGeom prst="rect">
             <a:avLst/>
           </a:prstGeom>
+          <a:solidFill>
+            <a:srgbClr val="002060"/>
+          </a:solidFill>
         </p:spPr>
         <p:style>
           <a:lnRef idx="2">
@@ -3081,12 +3075,15 @@
         </p:nvSpPr>
         <p:spPr>
           <a:xfrm>
-            <a:off x="4719735" y="1309255"/>
+            <a:off x="7197949" y="1248917"/>
             <a:ext cx="1527464" cy="727364"/>
           </a:xfrm>
           <a:prstGeom prst="rect">
             <a:avLst/>
           </a:prstGeom>
+          <a:solidFill>
+            <a:schemeClr val="tx1"/>
+          </a:solidFill>
         </p:spPr>
         <p:style>
           <a:lnRef idx="2">
@@ -3118,55 +3115,7 @@
             <a:pPr algn="ctr"/>
             <a:r>
               <a:rPr lang="en-US" dirty="0" smtClean="0"/>
-              <a:t>Lick </a:t>
-            </a:r>
-            <a:r>
-              <a:rPr lang="en-US" dirty="0" smtClean="0"/>
-              <a:t>Sensor</a:t>
-            </a:r>
-            <a:endParaRPr lang="en-US" dirty="0"/>
-          </a:p>
-        </p:txBody>
-      </p:sp>
-      <p:sp>
-        <p:nvSpPr>
-          <p:cNvPr id="8" name="Rectangle 7"/>
-          <p:cNvSpPr/>
-          <p:nvPr/>
-        </p:nvSpPr>
-        <p:spPr>
-          <a:xfrm>
-            <a:off x="6408257" y="1309255"/>
-            <a:ext cx="1589809" cy="727364"/>
-          </a:xfrm>
-          <a:prstGeom prst="rect">
-            <a:avLst/>
-          </a:prstGeom>
-        </p:spPr>
-        <p:style>
-          <a:lnRef idx="2">
-            <a:schemeClr val="accent2">
-              <a:shade val="50000"/>
-            </a:schemeClr>
-          </a:lnRef>
-          <a:fillRef idx="1">
-            <a:schemeClr val="accent2"/>
-          </a:fillRef>
-          <a:effectRef idx="0">
-            <a:schemeClr val="accent2"/>
-          </a:effectRef>
-          <a:fontRef idx="minor">
-            <a:schemeClr val="lt1"/>
-          </a:fontRef>
-        </p:style>
-        <p:txBody>
-          <a:bodyPr rtlCol="0" anchor="ctr"/>
-          <a:lstStyle/>
-          <a:p>
-            <a:pPr algn="ctr"/>
-            <a:r>
-              <a:rPr lang="en-US" dirty="0" smtClean="0"/>
-              <a:t>Infrared Sensor</a:t>
+              <a:t>Lick Sensor</a:t>
             </a:r>
             <a:endParaRPr lang="en-US" dirty="0"/>
           </a:p>
@@ -3180,16 +3129,14 @@
         </p:nvSpPr>
         <p:spPr>
           <a:xfrm>
-            <a:off x="5551006" y="2644487"/>
+            <a:off x="7140800" y="2497398"/>
             <a:ext cx="1641763" cy="768927"/>
           </a:xfrm>
           <a:prstGeom prst="rect">
             <a:avLst/>
           </a:prstGeom>
           <a:solidFill>
-            <a:schemeClr val="accent6">
-              <a:lumMod val="75000"/>
-            </a:schemeClr>
+            <a:srgbClr val="002060"/>
           </a:solidFill>
         </p:spPr>
         <p:style>
@@ -3226,48 +3173,14 @@
           <p:cNvPr id="13" name="Straight Arrow Connector 12"/>
           <p:cNvCxnSpPr>
             <a:stCxn id="7" idx="2"/>
+            <a:endCxn id="9" idx="0"/>
           </p:cNvCxnSpPr>
           <p:nvPr/>
         </p:nvCxnSpPr>
         <p:spPr>
           <a:xfrm>
-            <a:off x="5483467" y="2036619"/>
-            <a:ext cx="494108" cy="607868"/>
-          </a:xfrm>
-          <a:prstGeom prst="straightConnector1">
-            <a:avLst/>
-          </a:prstGeom>
-          <a:ln>
-            <a:tailEnd type="triangle"/>
-          </a:ln>
-        </p:spPr>
-        <p:style>
-          <a:lnRef idx="1">
-            <a:schemeClr val="accent1"/>
-          </a:lnRef>
-          <a:fillRef idx="0">
-            <a:schemeClr val="accent1"/>
-          </a:fillRef>
-          <a:effectRef idx="0">
-            <a:schemeClr val="accent1"/>
-          </a:effectRef>
-          <a:fontRef idx="minor">
-            <a:schemeClr val="tx1"/>
-          </a:fontRef>
-        </p:style>
-      </p:cxnSp>
-      <p:cxnSp>
-        <p:nvCxnSpPr>
-          <p:cNvPr id="15" name="Straight Arrow Connector 14"/>
-          <p:cNvCxnSpPr>
-            <a:stCxn id="8" idx="2"/>
-          </p:cNvCxnSpPr>
-          <p:nvPr/>
-        </p:nvCxnSpPr>
-        <p:spPr>
-          <a:xfrm flipH="1">
-            <a:off x="6979758" y="2036619"/>
-            <a:ext cx="223404" cy="607868"/>
+            <a:off x="7961681" y="1976281"/>
+            <a:ext cx="1" cy="521117"/>
           </a:xfrm>
           <a:prstGeom prst="straightConnector1">
             <a:avLst/>
@@ -3296,14 +3209,14 @@
           <p:cNvPr id="18" name="Straight Arrow Connector 17"/>
           <p:cNvCxnSpPr>
             <a:stCxn id="6" idx="2"/>
-            <a:endCxn id="5" idx="0"/>
+            <a:endCxn id="41" idx="0"/>
           </p:cNvCxnSpPr>
           <p:nvPr/>
         </p:nvCxnSpPr>
         <p:spPr>
           <a:xfrm>
-            <a:off x="3254617" y="2038697"/>
-            <a:ext cx="20782" cy="955964"/>
+            <a:off x="5270435" y="2016519"/>
+            <a:ext cx="1" cy="1312588"/>
           </a:xfrm>
           <a:prstGeom prst="straightConnector1">
             <a:avLst/>
@@ -3335,12 +3248,15 @@
         </p:nvSpPr>
         <p:spPr>
           <a:xfrm>
-            <a:off x="2303849" y="5155970"/>
+            <a:off x="4293690" y="5419292"/>
             <a:ext cx="1943100" cy="841663"/>
           </a:xfrm>
           <a:prstGeom prst="rect">
             <a:avLst/>
           </a:prstGeom>
+          <a:solidFill>
+            <a:srgbClr val="002060"/>
+          </a:solidFill>
         </p:spPr>
         <p:style>
           <a:lnRef idx="2">
@@ -3373,17 +3289,16 @@
       </p:sp>
       <p:cxnSp>
         <p:nvCxnSpPr>
-          <p:cNvPr id="22" name="Straight Arrow Connector 21"/>
+          <p:cNvPr id="31" name="Straight Arrow Connector 30"/>
           <p:cNvCxnSpPr>
-            <a:stCxn id="5" idx="2"/>
-            <a:endCxn id="20" idx="0"/>
+            <a:stCxn id="9" idx="1"/>
           </p:cNvCxnSpPr>
           <p:nvPr/>
         </p:nvCxnSpPr>
         <p:spPr>
-          <a:xfrm>
-            <a:off x="3275399" y="4366261"/>
-            <a:ext cx="0" cy="789709"/>
+          <a:xfrm flipH="1">
+            <a:off x="6247181" y="2881862"/>
+            <a:ext cx="893619" cy="461997"/>
           </a:xfrm>
           <a:prstGeom prst="straightConnector1">
             <a:avLst/>
@@ -3391,6 +3306,412 @@
           <a:ln>
             <a:tailEnd type="triangle"/>
           </a:ln>
+        </p:spPr>
+        <p:style>
+          <a:lnRef idx="1">
+            <a:schemeClr val="accent1"/>
+          </a:lnRef>
+          <a:fillRef idx="0">
+            <a:schemeClr val="accent1"/>
+          </a:fillRef>
+          <a:effectRef idx="0">
+            <a:schemeClr val="accent1"/>
+          </a:effectRef>
+          <a:fontRef idx="minor">
+            <a:schemeClr val="tx1"/>
+          </a:fontRef>
+        </p:style>
+      </p:cxnSp>
+      <p:sp>
+        <p:nvSpPr>
+          <p:cNvPr id="32" name="Rectangle 31"/>
+          <p:cNvSpPr/>
+          <p:nvPr/>
+        </p:nvSpPr>
+        <p:spPr>
+          <a:xfrm>
+            <a:off x="1758308" y="5492028"/>
+            <a:ext cx="1953491" cy="768927"/>
+          </a:xfrm>
+          <a:prstGeom prst="rect">
+            <a:avLst/>
+          </a:prstGeom>
+          <a:solidFill>
+            <a:srgbClr val="002060"/>
+          </a:solidFill>
+        </p:spPr>
+        <p:style>
+          <a:lnRef idx="2">
+            <a:schemeClr val="accent1">
+              <a:shade val="50000"/>
+            </a:schemeClr>
+          </a:lnRef>
+          <a:fillRef idx="1">
+            <a:schemeClr val="accent1"/>
+          </a:fillRef>
+          <a:effectRef idx="0">
+            <a:schemeClr val="accent1"/>
+          </a:effectRef>
+          <a:fontRef idx="minor">
+            <a:schemeClr val="lt1"/>
+          </a:fontRef>
+        </p:style>
+        <p:txBody>
+          <a:bodyPr rtlCol="0" anchor="ctr"/>
+          <a:lstStyle/>
+          <a:p>
+            <a:pPr algn="ctr"/>
+            <a:r>
+              <a:rPr lang="en-US" dirty="0" smtClean="0"/>
+              <a:t>Nexus 10</a:t>
+            </a:r>
+          </a:p>
+          <a:p>
+            <a:pPr algn="ctr"/>
+            <a:r>
+              <a:rPr lang="en-US" dirty="0" smtClean="0"/>
+              <a:t>“StimBot”</a:t>
+            </a:r>
+          </a:p>
+        </p:txBody>
+      </p:sp>
+      <p:cxnSp>
+        <p:nvCxnSpPr>
+          <p:cNvPr id="34" name="Straight Arrow Connector 33"/>
+          <p:cNvCxnSpPr>
+            <a:stCxn id="5" idx="2"/>
+            <a:endCxn id="32" idx="0"/>
+          </p:cNvCxnSpPr>
+          <p:nvPr/>
+        </p:nvCxnSpPr>
+        <p:spPr>
+          <a:xfrm flipH="1">
+            <a:off x="2735054" y="4408054"/>
+            <a:ext cx="5195" cy="1083974"/>
+          </a:xfrm>
+          <a:prstGeom prst="straightConnector1">
+            <a:avLst/>
+          </a:prstGeom>
+          <a:ln>
+            <a:tailEnd type="triangle"/>
+          </a:ln>
+        </p:spPr>
+        <p:style>
+          <a:lnRef idx="1">
+            <a:schemeClr val="accent1"/>
+          </a:lnRef>
+          <a:fillRef idx="0">
+            <a:schemeClr val="accent1"/>
+          </a:fillRef>
+          <a:effectRef idx="0">
+            <a:schemeClr val="accent1"/>
+          </a:effectRef>
+          <a:fontRef idx="minor">
+            <a:schemeClr val="tx1"/>
+          </a:fontRef>
+        </p:style>
+      </p:cxnSp>
+      <p:sp>
+        <p:nvSpPr>
+          <p:cNvPr id="2" name="TextBox 1"/>
+          <p:cNvSpPr txBox="1"/>
+          <p:nvPr/>
+        </p:nvSpPr>
+        <p:spPr>
+          <a:xfrm>
+            <a:off x="3361460" y="38680"/>
+            <a:ext cx="5615492" cy="584775"/>
+          </a:xfrm>
+          <a:prstGeom prst="rect">
+            <a:avLst/>
+          </a:prstGeom>
+          <a:noFill/>
+        </p:spPr>
+        <p:txBody>
+          <a:bodyPr wrap="square" rtlCol="0">
+            <a:spAutoFit/>
+          </a:bodyPr>
+          <a:lstStyle/>
+          <a:p>
+            <a:r>
+              <a:rPr lang="en-US" sz="3200" dirty="0" smtClean="0"/>
+              <a:t>ShrewDriver Hardware Layout</a:t>
+            </a:r>
+            <a:endParaRPr lang="en-US" sz="3200" dirty="0"/>
+          </a:p>
+        </p:txBody>
+      </p:sp>
+      <p:sp>
+        <p:nvSpPr>
+          <p:cNvPr id="23" name="Rectangle 22"/>
+          <p:cNvSpPr/>
+          <p:nvPr/>
+        </p:nvSpPr>
+        <p:spPr>
+          <a:xfrm>
+            <a:off x="9268572" y="1233368"/>
+            <a:ext cx="1589809" cy="727364"/>
+          </a:xfrm>
+          <a:prstGeom prst="rect">
+            <a:avLst/>
+          </a:prstGeom>
+          <a:solidFill>
+            <a:schemeClr val="tx1"/>
+          </a:solidFill>
+        </p:spPr>
+        <p:style>
+          <a:lnRef idx="2">
+            <a:schemeClr val="accent2">
+              <a:shade val="50000"/>
+            </a:schemeClr>
+          </a:lnRef>
+          <a:fillRef idx="1">
+            <a:schemeClr val="accent2"/>
+          </a:fillRef>
+          <a:effectRef idx="0">
+            <a:schemeClr val="accent2"/>
+          </a:effectRef>
+          <a:fontRef idx="minor">
+            <a:schemeClr val="lt1"/>
+          </a:fontRef>
+        </p:style>
+        <p:txBody>
+          <a:bodyPr rtlCol="0" anchor="ctr"/>
+          <a:lstStyle/>
+          <a:p>
+            <a:pPr algn="ctr"/>
+            <a:r>
+              <a:rPr lang="en-US" dirty="0" smtClean="0"/>
+              <a:t>Capacitive Tap</a:t>
+            </a:r>
+          </a:p>
+          <a:p>
+            <a:pPr algn="ctr"/>
+            <a:r>
+              <a:rPr lang="en-US" dirty="0" smtClean="0"/>
+              <a:t>Sensor</a:t>
+            </a:r>
+            <a:endParaRPr lang="en-US" dirty="0"/>
+          </a:p>
+        </p:txBody>
+      </p:sp>
+      <p:cxnSp>
+        <p:nvCxnSpPr>
+          <p:cNvPr id="25" name="Straight Arrow Connector 24"/>
+          <p:cNvCxnSpPr/>
+          <p:nvPr/>
+        </p:nvCxnSpPr>
+        <p:spPr>
+          <a:xfrm flipH="1">
+            <a:off x="8782564" y="1960732"/>
+            <a:ext cx="486008" cy="536666"/>
+          </a:xfrm>
+          <a:prstGeom prst="straightConnector1">
+            <a:avLst/>
+          </a:prstGeom>
+          <a:ln>
+            <a:tailEnd type="triangle"/>
+          </a:ln>
+        </p:spPr>
+        <p:style>
+          <a:lnRef idx="1">
+            <a:schemeClr val="accent1"/>
+          </a:lnRef>
+          <a:fillRef idx="0">
+            <a:schemeClr val="accent1"/>
+          </a:fillRef>
+          <a:effectRef idx="0">
+            <a:schemeClr val="accent1"/>
+          </a:effectRef>
+          <a:fontRef idx="minor">
+            <a:schemeClr val="tx1"/>
+          </a:fontRef>
+        </p:style>
+      </p:cxnSp>
+      <p:sp>
+        <p:nvSpPr>
+          <p:cNvPr id="30" name="TextBox 29"/>
+          <p:cNvSpPr txBox="1"/>
+          <p:nvPr/>
+        </p:nvSpPr>
+        <p:spPr>
+          <a:xfrm>
+            <a:off x="2773947" y="2277225"/>
+            <a:ext cx="626124" cy="369332"/>
+          </a:xfrm>
+          <a:prstGeom prst="rect">
+            <a:avLst/>
+          </a:prstGeom>
+          <a:noFill/>
+        </p:spPr>
+        <p:txBody>
+          <a:bodyPr wrap="square" rtlCol="0">
+            <a:spAutoFit/>
+          </a:bodyPr>
+          <a:lstStyle/>
+          <a:p>
+            <a:r>
+              <a:rPr lang="en-US" dirty="0" smtClean="0"/>
+              <a:t>USB</a:t>
+            </a:r>
+            <a:endParaRPr lang="en-US" dirty="0"/>
+          </a:p>
+        </p:txBody>
+      </p:sp>
+      <p:sp>
+        <p:nvSpPr>
+          <p:cNvPr id="33" name="TextBox 32"/>
+          <p:cNvSpPr txBox="1"/>
+          <p:nvPr/>
+        </p:nvSpPr>
+        <p:spPr>
+          <a:xfrm>
+            <a:off x="2007003" y="4769772"/>
+            <a:ext cx="707666" cy="369332"/>
+          </a:xfrm>
+          <a:prstGeom prst="rect">
+            <a:avLst/>
+          </a:prstGeom>
+          <a:noFill/>
+        </p:spPr>
+        <p:txBody>
+          <a:bodyPr wrap="square" rtlCol="0">
+            <a:spAutoFit/>
+          </a:bodyPr>
+          <a:lstStyle/>
+          <a:p>
+            <a:r>
+              <a:rPr lang="en-US" dirty="0" smtClean="0"/>
+              <a:t>Serial</a:t>
+            </a:r>
+            <a:endParaRPr lang="en-US" dirty="0"/>
+          </a:p>
+        </p:txBody>
+      </p:sp>
+      <p:sp>
+        <p:nvSpPr>
+          <p:cNvPr id="35" name="TextBox 34"/>
+          <p:cNvSpPr txBox="1"/>
+          <p:nvPr/>
+        </p:nvSpPr>
+        <p:spPr>
+          <a:xfrm>
+            <a:off x="4598345" y="4722171"/>
+            <a:ext cx="626124" cy="369332"/>
+          </a:xfrm>
+          <a:prstGeom prst="rect">
+            <a:avLst/>
+          </a:prstGeom>
+          <a:noFill/>
+        </p:spPr>
+        <p:txBody>
+          <a:bodyPr wrap="square" rtlCol="0">
+            <a:spAutoFit/>
+          </a:bodyPr>
+          <a:lstStyle/>
+          <a:p>
+            <a:r>
+              <a:rPr lang="en-US" dirty="0" smtClean="0"/>
+              <a:t>USB</a:t>
+            </a:r>
+            <a:endParaRPr lang="en-US" dirty="0"/>
+          </a:p>
+        </p:txBody>
+      </p:sp>
+      <p:sp>
+        <p:nvSpPr>
+          <p:cNvPr id="36" name="TextBox 35"/>
+          <p:cNvSpPr txBox="1"/>
+          <p:nvPr/>
+        </p:nvSpPr>
+        <p:spPr>
+          <a:xfrm>
+            <a:off x="6146735" y="2667122"/>
+            <a:ext cx="626124" cy="369332"/>
+          </a:xfrm>
+          <a:prstGeom prst="rect">
+            <a:avLst/>
+          </a:prstGeom>
+          <a:noFill/>
+        </p:spPr>
+        <p:txBody>
+          <a:bodyPr wrap="square" rtlCol="0">
+            <a:spAutoFit/>
+          </a:bodyPr>
+          <a:lstStyle/>
+          <a:p>
+            <a:r>
+              <a:rPr lang="en-US" dirty="0" smtClean="0"/>
+              <a:t>USB</a:t>
+            </a:r>
+            <a:endParaRPr lang="en-US" dirty="0"/>
+          </a:p>
+        </p:txBody>
+      </p:sp>
+      <p:sp>
+        <p:nvSpPr>
+          <p:cNvPr id="41" name="Rectangle 40"/>
+          <p:cNvSpPr/>
+          <p:nvPr/>
+        </p:nvSpPr>
+        <p:spPr>
+          <a:xfrm>
+            <a:off x="4293690" y="3329107"/>
+            <a:ext cx="1953491" cy="768927"/>
+          </a:xfrm>
+          <a:prstGeom prst="rect">
+            <a:avLst/>
+          </a:prstGeom>
+          <a:solidFill>
+            <a:schemeClr val="accent3"/>
+          </a:solidFill>
+        </p:spPr>
+        <p:style>
+          <a:lnRef idx="2">
+            <a:schemeClr val="accent1">
+              <a:shade val="50000"/>
+            </a:schemeClr>
+          </a:lnRef>
+          <a:fillRef idx="1">
+            <a:schemeClr val="accent1"/>
+          </a:fillRef>
+          <a:effectRef idx="0">
+            <a:schemeClr val="accent1"/>
+          </a:effectRef>
+          <a:fontRef idx="minor">
+            <a:schemeClr val="lt1"/>
+          </a:fontRef>
+        </p:style>
+        <p:txBody>
+          <a:bodyPr rtlCol="0" anchor="ctr"/>
+          <a:lstStyle/>
+          <a:p>
+            <a:pPr algn="ctr"/>
+            <a:r>
+              <a:rPr lang="en-US" dirty="0" smtClean="0"/>
+              <a:t>USB Hub</a:t>
+            </a:r>
+            <a:endParaRPr lang="en-US" dirty="0" smtClean="0"/>
+          </a:p>
+        </p:txBody>
+      </p:sp>
+      <p:cxnSp>
+        <p:nvCxnSpPr>
+          <p:cNvPr id="50" name="Straight Connector 49"/>
+          <p:cNvCxnSpPr>
+            <a:stCxn id="5" idx="3"/>
+            <a:endCxn id="41" idx="1"/>
+          </p:cNvCxnSpPr>
+          <p:nvPr/>
+        </p:nvCxnSpPr>
+        <p:spPr>
+          <a:xfrm flipV="1">
+            <a:off x="3711799" y="3713571"/>
+            <a:ext cx="581891" cy="8683"/>
+          </a:xfrm>
+          <a:prstGeom prst="line">
+            <a:avLst/>
+          </a:prstGeom>
         </p:spPr>
         <p:style>
           <a:lnRef idx="1">
@@ -3409,16 +3730,17 @@
       </p:cxnSp>
       <p:cxnSp>
         <p:nvCxnSpPr>
-          <p:cNvPr id="31" name="Straight Arrow Connector 30"/>
+          <p:cNvPr id="63" name="Straight Arrow Connector 62"/>
           <p:cNvCxnSpPr>
-            <a:stCxn id="9" idx="1"/>
+            <a:stCxn id="41" idx="2"/>
+            <a:endCxn id="20" idx="0"/>
           </p:cNvCxnSpPr>
           <p:nvPr/>
         </p:nvCxnSpPr>
         <p:spPr>
           <a:xfrm flipH="1">
-            <a:off x="4240458" y="3028951"/>
-            <a:ext cx="1310548" cy="405245"/>
+            <a:off x="5265240" y="4098034"/>
+            <a:ext cx="5196" cy="1321258"/>
           </a:xfrm>
           <a:prstGeom prst="straightConnector1">
             <a:avLst/>
@@ -3444,138 +3766,21 @@
       </p:cxnSp>
       <p:sp>
         <p:nvSpPr>
-          <p:cNvPr id="32" name="Rectangle 31"/>
+          <p:cNvPr id="65" name="Rectangle 64"/>
           <p:cNvSpPr/>
           <p:nvPr/>
         </p:nvSpPr>
         <p:spPr>
           <a:xfrm>
-            <a:off x="5538023" y="3896592"/>
-            <a:ext cx="1953491" cy="768927"/>
+            <a:off x="2002494" y="1207084"/>
+            <a:ext cx="1465118" cy="685800"/>
           </a:xfrm>
           <a:prstGeom prst="rect">
             <a:avLst/>
           </a:prstGeom>
           <a:solidFill>
-            <a:schemeClr val="accent6">
-              <a:lumMod val="75000"/>
-            </a:schemeClr>
+            <a:srgbClr val="002060"/>
           </a:solidFill>
-        </p:spPr>
-        <p:style>
-          <a:lnRef idx="2">
-            <a:schemeClr val="accent1">
-              <a:shade val="50000"/>
-            </a:schemeClr>
-          </a:lnRef>
-          <a:fillRef idx="1">
-            <a:schemeClr val="accent1"/>
-          </a:fillRef>
-          <a:effectRef idx="0">
-            <a:schemeClr val="accent1"/>
-          </a:effectRef>
-          <a:fontRef idx="minor">
-            <a:schemeClr val="lt1"/>
-          </a:fontRef>
-        </p:style>
-        <p:txBody>
-          <a:bodyPr rtlCol="0" anchor="ctr"/>
-          <a:lstStyle/>
-          <a:p>
-            <a:pPr algn="ctr"/>
-            <a:r>
-              <a:rPr lang="en-US" dirty="0" smtClean="0"/>
-              <a:t>Nexus 10</a:t>
-            </a:r>
-          </a:p>
-          <a:p>
-            <a:pPr algn="ctr"/>
-            <a:r>
-              <a:rPr lang="en-US" dirty="0" smtClean="0"/>
-              <a:t>“StimBot”</a:t>
-            </a:r>
-          </a:p>
-        </p:txBody>
-      </p:sp>
-      <p:cxnSp>
-        <p:nvCxnSpPr>
-          <p:cNvPr id="34" name="Straight Arrow Connector 33"/>
-          <p:cNvCxnSpPr>
-            <a:endCxn id="32" idx="1"/>
-          </p:cNvCxnSpPr>
-          <p:nvPr/>
-        </p:nvCxnSpPr>
-        <p:spPr>
-          <a:xfrm>
-            <a:off x="4240458" y="3896592"/>
-            <a:ext cx="1297565" cy="384464"/>
-          </a:xfrm>
-          <a:prstGeom prst="straightConnector1">
-            <a:avLst/>
-          </a:prstGeom>
-          <a:ln>
-            <a:tailEnd type="triangle"/>
-          </a:ln>
-        </p:spPr>
-        <p:style>
-          <a:lnRef idx="1">
-            <a:schemeClr val="accent1"/>
-          </a:lnRef>
-          <a:fillRef idx="0">
-            <a:schemeClr val="accent1"/>
-          </a:fillRef>
-          <a:effectRef idx="0">
-            <a:schemeClr val="accent1"/>
-          </a:effectRef>
-          <a:fontRef idx="minor">
-            <a:schemeClr val="tx1"/>
-          </a:fontRef>
-        </p:style>
-      </p:cxnSp>
-      <p:sp>
-        <p:nvSpPr>
-          <p:cNvPr id="2" name="TextBox 1"/>
-          <p:cNvSpPr txBox="1"/>
-          <p:nvPr/>
-        </p:nvSpPr>
-        <p:spPr>
-          <a:xfrm>
-            <a:off x="3361460" y="38680"/>
-            <a:ext cx="5615492" cy="584775"/>
-          </a:xfrm>
-          <a:prstGeom prst="rect">
-            <a:avLst/>
-          </a:prstGeom>
-          <a:noFill/>
-        </p:spPr>
-        <p:txBody>
-          <a:bodyPr wrap="square" rtlCol="0">
-            <a:spAutoFit/>
-          </a:bodyPr>
-          <a:lstStyle/>
-          <a:p>
-            <a:r>
-              <a:rPr lang="en-US" sz="3200" dirty="0" smtClean="0"/>
-              <a:t>ShrewDriver System Layout</a:t>
-            </a:r>
-            <a:endParaRPr lang="en-US" sz="3200" dirty="0"/>
-          </a:p>
-        </p:txBody>
-      </p:sp>
-      <p:sp>
-        <p:nvSpPr>
-          <p:cNvPr id="23" name="Rectangle 22"/>
-          <p:cNvSpPr/>
-          <p:nvPr/>
-        </p:nvSpPr>
-        <p:spPr>
-          <a:xfrm>
-            <a:off x="8205345" y="1309255"/>
-            <a:ext cx="1589809" cy="727364"/>
-          </a:xfrm>
-          <a:prstGeom prst="rect">
-            <a:avLst/>
-          </a:prstGeom>
         </p:spPr>
         <p:style>
           <a:lnRef idx="2">
@@ -3600,14 +3805,14 @@
             <a:pPr algn="ctr"/>
             <a:r>
               <a:rPr lang="en-US" dirty="0" smtClean="0"/>
-              <a:t>Capacitive Tap</a:t>
+              <a:t>Air Puff</a:t>
             </a:r>
           </a:p>
           <a:p>
             <a:pPr algn="ctr"/>
             <a:r>
               <a:rPr lang="en-US" dirty="0" smtClean="0"/>
-              <a:t>Sensor</a:t>
+              <a:t>(optional)</a:t>
             </a:r>
             <a:endParaRPr lang="en-US" dirty="0"/>
           </a:p>
@@ -3615,16 +3820,17 @@
       </p:sp>
       <p:cxnSp>
         <p:nvCxnSpPr>
-          <p:cNvPr id="25" name="Straight Arrow Connector 24"/>
+          <p:cNvPr id="67" name="Straight Arrow Connector 66"/>
           <p:cNvCxnSpPr>
-            <a:endCxn id="9" idx="3"/>
+            <a:stCxn id="5" idx="0"/>
+            <a:endCxn id="65" idx="2"/>
           </p:cNvCxnSpPr>
           <p:nvPr/>
         </p:nvCxnSpPr>
         <p:spPr>
-          <a:xfrm flipH="1">
-            <a:off x="7192769" y="2036619"/>
-            <a:ext cx="1843850" cy="992332"/>
+          <a:xfrm flipH="1" flipV="1">
+            <a:off x="2735053" y="1892884"/>
+            <a:ext cx="5196" cy="1143570"/>
           </a:xfrm>
           <a:prstGeom prst="straightConnector1">
             <a:avLst/>
@@ -3650,103 +3856,13 @@
       </p:cxnSp>
       <p:sp>
         <p:nvSpPr>
-          <p:cNvPr id="30" name="TextBox 29"/>
+          <p:cNvPr id="68" name="TextBox 67"/>
           <p:cNvSpPr txBox="1"/>
           <p:nvPr/>
         </p:nvSpPr>
         <p:spPr>
           <a:xfrm>
-            <a:off x="3180522" y="2355165"/>
-            <a:ext cx="626124" cy="369332"/>
-          </a:xfrm>
-          <a:prstGeom prst="rect">
-            <a:avLst/>
-          </a:prstGeom>
-          <a:noFill/>
-        </p:spPr>
-        <p:txBody>
-          <a:bodyPr wrap="square" rtlCol="0">
-            <a:spAutoFit/>
-          </a:bodyPr>
-          <a:lstStyle/>
-          <a:p>
-            <a:r>
-              <a:rPr lang="en-US" dirty="0" smtClean="0"/>
-              <a:t>USB</a:t>
-            </a:r>
-            <a:endParaRPr lang="en-US" dirty="0"/>
-          </a:p>
-        </p:txBody>
-      </p:sp>
-      <p:sp>
-        <p:nvSpPr>
-          <p:cNvPr id="33" name="TextBox 32"/>
-          <p:cNvSpPr txBox="1"/>
-          <p:nvPr/>
-        </p:nvSpPr>
-        <p:spPr>
-          <a:xfrm>
-            <a:off x="4504343" y="3996929"/>
-            <a:ext cx="707666" cy="369332"/>
-          </a:xfrm>
-          <a:prstGeom prst="rect">
-            <a:avLst/>
-          </a:prstGeom>
-          <a:noFill/>
-        </p:spPr>
-        <p:txBody>
-          <a:bodyPr wrap="square" rtlCol="0">
-            <a:spAutoFit/>
-          </a:bodyPr>
-          <a:lstStyle/>
-          <a:p>
-            <a:r>
-              <a:rPr lang="en-US" dirty="0" smtClean="0"/>
-              <a:t>Serial</a:t>
-            </a:r>
-            <a:endParaRPr lang="en-US" dirty="0"/>
-          </a:p>
-        </p:txBody>
-      </p:sp>
-      <p:sp>
-        <p:nvSpPr>
-          <p:cNvPr id="35" name="TextBox 34"/>
-          <p:cNvSpPr txBox="1"/>
-          <p:nvPr/>
-        </p:nvSpPr>
-        <p:spPr>
-          <a:xfrm>
-            <a:off x="3254617" y="4560411"/>
-            <a:ext cx="626124" cy="369332"/>
-          </a:xfrm>
-          <a:prstGeom prst="rect">
-            <a:avLst/>
-          </a:prstGeom>
-          <a:noFill/>
-        </p:spPr>
-        <p:txBody>
-          <a:bodyPr wrap="square" rtlCol="0">
-            <a:spAutoFit/>
-          </a:bodyPr>
-          <a:lstStyle/>
-          <a:p>
-            <a:r>
-              <a:rPr lang="en-US" dirty="0" smtClean="0"/>
-              <a:t>USB</a:t>
-            </a:r>
-            <a:endParaRPr lang="en-US" dirty="0"/>
-          </a:p>
-        </p:txBody>
-      </p:sp>
-      <p:sp>
-        <p:nvSpPr>
-          <p:cNvPr id="36" name="TextBox 35"/>
-          <p:cNvSpPr txBox="1"/>
-          <p:nvPr/>
-        </p:nvSpPr>
-        <p:spPr>
-          <a:xfrm>
-            <a:off x="4604100" y="2902516"/>
+            <a:off x="4732634" y="2273498"/>
             <a:ext cx="626124" cy="369332"/>
           </a:xfrm>
           <a:prstGeom prst="rect">

</xml_diff>